<commit_message>
AB:Final Testing and documentation completed
</commit_message>
<xml_diff>
--- a/IMS Documentation/Inventory Management System Project Presentation.pptx
+++ b/IMS Documentation/Inventory Management System Project Presentation.pptx
@@ -113,6 +113,11 @@
       </a:defRPr>
     </a:lvl9pPr>
   </p:defaultTextStyle>
+  <p:extLst>
+    <p:ext uri="{EFAFB233-063F-42B5-8137-9DF3F51BA10A}">
+      <p15:sldGuideLst xmlns:p15="http://schemas.microsoft.com/office/powerpoint/2012/main"/>
+    </p:ext>
+  </p:extLst>
 </p:presentation>
 </file>
 
@@ -13414,10 +13419,40 @@
           <a:bodyPr/>
           <a:lstStyle/>
           <a:p>
-            <a:endParaRPr lang="en-GB" dirty="0"/>
+            <a:pPr marL="0" indent="0">
+              <a:buNone/>
+            </a:pPr>
+            <a:r>
+              <a:rPr lang="en-GB" b="1" dirty="0" smtClean="0"/>
+              <a:t>Testing Coverage Amount:</a:t>
+            </a:r>
+            <a:endParaRPr lang="en-GB" b="1" dirty="0"/>
           </a:p>
         </p:txBody>
       </p:sp>
+      <p:pic>
+        <p:nvPicPr>
+          <p:cNvPr id="4" name="Picture 3"/>
+          <p:cNvPicPr>
+            <a:picLocks noChangeAspect="1"/>
+          </p:cNvPicPr>
+          <p:nvPr/>
+        </p:nvPicPr>
+        <p:blipFill rotWithShape="1">
+          <a:blip r:embed="rId2"/>
+          <a:srcRect r="10109"/>
+          <a:stretch/>
+        </p:blipFill>
+        <p:spPr>
+          <a:xfrm>
+            <a:off x="1154954" y="3007364"/>
+            <a:ext cx="9812110" cy="3705225"/>
+          </a:xfrm>
+          <a:prstGeom prst="rect">
+            <a:avLst/>
+          </a:prstGeom>
+        </p:spPr>
+      </p:pic>
     </p:spTree>
     <p:extLst>
       <p:ext uri="{BB962C8B-B14F-4D97-AF65-F5344CB8AC3E}">

</xml_diff>